<commit_message>
Präsentationen Firmen und SRDP
</commit_message>
<xml_diff>
--- a/Planung/Praesentationen/Praesentation_Firmentag.pptx
+++ b/Planung/Praesentationen/Praesentation_Firmentag.pptx
@@ -7,17 +7,19 @@
     <p:sldMasterId id="2147483720" r:id="rId3"/>
   </p:sldMasterIdLst>
   <p:notesMasterIdLst>
-    <p:notesMasterId r:id="rId12"/>
+    <p:notesMasterId r:id="rId14"/>
   </p:notesMasterIdLst>
   <p:sldIdLst>
     <p:sldId id="257" r:id="rId4"/>
     <p:sldId id="258" r:id="rId5"/>
-    <p:sldId id="268" r:id="rId6"/>
-    <p:sldId id="269" r:id="rId7"/>
-    <p:sldId id="270" r:id="rId8"/>
-    <p:sldId id="271" r:id="rId9"/>
-    <p:sldId id="272" r:id="rId10"/>
-    <p:sldId id="267" r:id="rId11"/>
+    <p:sldId id="274" r:id="rId6"/>
+    <p:sldId id="268" r:id="rId7"/>
+    <p:sldId id="269" r:id="rId8"/>
+    <p:sldId id="270" r:id="rId9"/>
+    <p:sldId id="273" r:id="rId10"/>
+    <p:sldId id="271" r:id="rId11"/>
+    <p:sldId id="272" r:id="rId12"/>
+    <p:sldId id="267" r:id="rId13"/>
   </p:sldIdLst>
   <p:sldSz cx="12192000" cy="6858000"/>
   <p:notesSz cx="6858000" cy="9144000"/>
@@ -138,10 +140,6 @@
     </p:ext>
   </p:extLst>
 </p:presentation>
-</file>
-
-<file path=ppt/revisionInfo.xml><?xml version="1.0" encoding="utf-8"?>
-<p1510:revInfo xmlns:a="http://schemas.openxmlformats.org/drawingml/2006/main" xmlns:r="http://schemas.openxmlformats.org/officeDocument/2006/relationships" xmlns:p1510="http://schemas.microsoft.com/office/powerpoint/2015/10/main"/>
 </file>
 
 <file path=ppt/diagrams/colors1.xml><?xml version="1.0" encoding="utf-8"?>
@@ -2822,7 +2820,7 @@
           <a:p>
             <a:fld id="{6C12F6B1-6786-4E64-B681-F379C9A54FC0}" type="datetimeFigureOut">
               <a:rPr lang="de-AT" smtClean="0"/>
-              <a:t>20.01.2018</a:t>
+              <a:t>31.03.2018</a:t>
             </a:fld>
             <a:endParaRPr lang="de-AT"/>
           </a:p>
@@ -3169,36 +3167,6 @@
             </a:r>
           </a:p>
           <a:p>
-            <a:endParaRPr lang="de-AT" dirty="0"/>
-          </a:p>
-          <a:p>
-            <a:r>
-              <a:rPr lang="de-AT" dirty="0"/>
-              <a:t>Projektteam: </a:t>
-            </a:r>
-          </a:p>
-          <a:p>
-            <a:pPr lvl="1"/>
-            <a:r>
-              <a:rPr lang="de-AT" dirty="0"/>
-              <a:t>Projektleiter: Lukas Knoll</a:t>
-            </a:r>
-          </a:p>
-          <a:p>
-            <a:pPr lvl="1"/>
-            <a:r>
-              <a:rPr lang="de-AT" dirty="0"/>
-              <a:t>Projektmitglied: Niklas Graf</a:t>
-            </a:r>
-          </a:p>
-          <a:p>
-            <a:pPr lvl="1"/>
-            <a:r>
-              <a:rPr lang="de-AT" dirty="0"/>
-              <a:t>Projektmitglied: Sebastian Mandl</a:t>
-            </a:r>
-          </a:p>
-          <a:p>
             <a:pPr lvl="1"/>
             <a:endParaRPr lang="de-AT" dirty="0"/>
           </a:p>
@@ -3323,7 +3291,7 @@
           <a:p>
             <a:fld id="{B7AC7242-7699-4B54-8BDA-8FADE3A1DDAA}" type="slidenum">
               <a:rPr lang="de-AT" smtClean="0"/>
-              <a:t>3</a:t>
+              <a:t>4</a:t>
             </a:fld>
             <a:endParaRPr lang="de-AT"/>
           </a:p>
@@ -3333,6 +3301,90 @@
     <p:extLst>
       <p:ext uri="{BB962C8B-B14F-4D97-AF65-F5344CB8AC3E}">
         <p14:creationId xmlns:p14="http://schemas.microsoft.com/office/powerpoint/2010/main" val="444327789"/>
+      </p:ext>
+    </p:extLst>
+  </p:cSld>
+  <p:clrMapOvr>
+    <a:masterClrMapping/>
+  </p:clrMapOvr>
+</p:notes>
+</file>
+
+<file path=ppt/notesSlides/notesSlide3.xml><?xml version="1.0" encoding="utf-8"?>
+<p:notes xmlns:a="http://schemas.openxmlformats.org/drawingml/2006/main" xmlns:r="http://schemas.openxmlformats.org/officeDocument/2006/relationships" xmlns:p="http://schemas.openxmlformats.org/presentationml/2006/main">
+  <p:cSld>
+    <p:spTree>
+      <p:nvGrpSpPr>
+        <p:cNvPr id="1" name=""/>
+        <p:cNvGrpSpPr/>
+        <p:nvPr/>
+      </p:nvGrpSpPr>
+      <p:grpSpPr>
+        <a:xfrm>
+          <a:off x="0" y="0"/>
+          <a:ext cx="0" cy="0"/>
+          <a:chOff x="0" y="0"/>
+          <a:chExt cx="0" cy="0"/>
+        </a:xfrm>
+      </p:grpSpPr>
+      <p:sp>
+        <p:nvSpPr>
+          <p:cNvPr id="2" name="Folienbildplatzhalter 1"/>
+          <p:cNvSpPr>
+            <a:spLocks noGrp="1" noRot="1" noChangeAspect="1"/>
+          </p:cNvSpPr>
+          <p:nvPr>
+            <p:ph type="sldImg"/>
+          </p:nvPr>
+        </p:nvSpPr>
+        <p:spPr/>
+      </p:sp>
+      <p:sp>
+        <p:nvSpPr>
+          <p:cNvPr id="3" name="Notizenplatzhalter 2"/>
+          <p:cNvSpPr>
+            <a:spLocks noGrp="1"/>
+          </p:cNvSpPr>
+          <p:nvPr>
+            <p:ph type="body" idx="1"/>
+          </p:nvPr>
+        </p:nvSpPr>
+        <p:spPr/>
+        <p:txBody>
+          <a:bodyPr/>
+          <a:lstStyle/>
+          <a:p>
+            <a:endParaRPr lang="de-AT" dirty="0"/>
+          </a:p>
+        </p:txBody>
+      </p:sp>
+      <p:sp>
+        <p:nvSpPr>
+          <p:cNvPr id="4" name="Foliennummernplatzhalter 3"/>
+          <p:cNvSpPr>
+            <a:spLocks noGrp="1"/>
+          </p:cNvSpPr>
+          <p:nvPr>
+            <p:ph type="sldNum" sz="quarter" idx="10"/>
+          </p:nvPr>
+        </p:nvSpPr>
+        <p:spPr/>
+        <p:txBody>
+          <a:bodyPr/>
+          <a:lstStyle/>
+          <a:p>
+            <a:fld id="{B7AC7242-7699-4B54-8BDA-8FADE3A1DDAA}" type="slidenum">
+              <a:rPr lang="de-AT" smtClean="0"/>
+              <a:t>10</a:t>
+            </a:fld>
+            <a:endParaRPr lang="de-AT"/>
+          </a:p>
+        </p:txBody>
+      </p:sp>
+    </p:spTree>
+    <p:extLst>
+      <p:ext uri="{BB962C8B-B14F-4D97-AF65-F5344CB8AC3E}">
+        <p14:creationId xmlns:p14="http://schemas.microsoft.com/office/powerpoint/2010/main" val="1404397067"/>
       </p:ext>
     </p:extLst>
   </p:cSld>
@@ -3484,7 +3536,7 @@
           <a:p>
             <a:fld id="{83C286D2-5717-406C-AD4B-C4A69D5338FB}" type="datetimeFigureOut">
               <a:rPr lang="de-AT" smtClean="0"/>
-              <a:t>20.01.2018</a:t>
+              <a:t>31.03.2018</a:t>
             </a:fld>
             <a:endParaRPr lang="de-AT"/>
           </a:p>
@@ -3654,7 +3706,7 @@
           <a:p>
             <a:fld id="{83C286D2-5717-406C-AD4B-C4A69D5338FB}" type="datetimeFigureOut">
               <a:rPr lang="de-AT" smtClean="0"/>
-              <a:t>20.01.2018</a:t>
+              <a:t>31.03.2018</a:t>
             </a:fld>
             <a:endParaRPr lang="de-AT"/>
           </a:p>
@@ -3834,7 +3886,7 @@
           <a:p>
             <a:fld id="{83C286D2-5717-406C-AD4B-C4A69D5338FB}" type="datetimeFigureOut">
               <a:rPr lang="de-AT" smtClean="0"/>
-              <a:t>20.01.2018</a:t>
+              <a:t>31.03.2018</a:t>
             </a:fld>
             <a:endParaRPr lang="de-AT"/>
           </a:p>
@@ -4037,7 +4089,7 @@
           <a:p>
             <a:fld id="{83C286D2-5717-406C-AD4B-C4A69D5338FB}" type="datetimeFigureOut">
               <a:rPr lang="de-AT" smtClean="0"/>
-              <a:t>20.01.2018</a:t>
+              <a:t>31.03.2018</a:t>
             </a:fld>
             <a:endParaRPr lang="de-AT"/>
           </a:p>
@@ -4207,7 +4259,7 @@
           <a:p>
             <a:fld id="{83C286D2-5717-406C-AD4B-C4A69D5338FB}" type="datetimeFigureOut">
               <a:rPr lang="de-AT" smtClean="0"/>
-              <a:t>20.01.2018</a:t>
+              <a:t>31.03.2018</a:t>
             </a:fld>
             <a:endParaRPr lang="de-AT"/>
           </a:p>
@@ -4458,7 +4510,7 @@
           <a:p>
             <a:fld id="{83C286D2-5717-406C-AD4B-C4A69D5338FB}" type="datetimeFigureOut">
               <a:rPr lang="de-AT" smtClean="0"/>
-              <a:t>20.01.2018</a:t>
+              <a:t>31.03.2018</a:t>
             </a:fld>
             <a:endParaRPr lang="de-AT"/>
           </a:p>
@@ -4690,7 +4742,7 @@
           <a:p>
             <a:fld id="{83C286D2-5717-406C-AD4B-C4A69D5338FB}" type="datetimeFigureOut">
               <a:rPr lang="de-AT" smtClean="0"/>
-              <a:t>20.01.2018</a:t>
+              <a:t>31.03.2018</a:t>
             </a:fld>
             <a:endParaRPr lang="de-AT"/>
           </a:p>
@@ -5037,7 +5089,7 @@
           <a:p>
             <a:fld id="{83C286D2-5717-406C-AD4B-C4A69D5338FB}" type="datetimeFigureOut">
               <a:rPr lang="de-AT" smtClean="0"/>
-              <a:t>20.01.2018</a:t>
+              <a:t>31.03.2018</a:t>
             </a:fld>
             <a:endParaRPr lang="de-AT"/>
           </a:p>
@@ -5155,7 +5207,7 @@
           <a:p>
             <a:fld id="{83C286D2-5717-406C-AD4B-C4A69D5338FB}" type="datetimeFigureOut">
               <a:rPr lang="de-AT" smtClean="0"/>
-              <a:t>20.01.2018</a:t>
+              <a:t>31.03.2018</a:t>
             </a:fld>
             <a:endParaRPr lang="de-AT"/>
           </a:p>
@@ -5273,7 +5325,7 @@
           <a:p>
             <a:fld id="{83C286D2-5717-406C-AD4B-C4A69D5338FB}" type="datetimeFigureOut">
               <a:rPr lang="de-AT" smtClean="0"/>
-              <a:t>20.01.2018</a:t>
+              <a:t>31.03.2018</a:t>
             </a:fld>
             <a:endParaRPr lang="de-AT"/>
           </a:p>
@@ -5557,7 +5609,7 @@
           <a:p>
             <a:fld id="{83C286D2-5717-406C-AD4B-C4A69D5338FB}" type="datetimeFigureOut">
               <a:rPr lang="de-AT" smtClean="0"/>
-              <a:t>20.01.2018</a:t>
+              <a:t>31.03.2018</a:t>
             </a:fld>
             <a:endParaRPr lang="de-AT"/>
           </a:p>
@@ -5727,7 +5779,7 @@
           <a:p>
             <a:fld id="{83C286D2-5717-406C-AD4B-C4A69D5338FB}" type="datetimeFigureOut">
               <a:rPr lang="de-AT" smtClean="0"/>
-              <a:t>20.01.2018</a:t>
+              <a:t>31.03.2018</a:t>
             </a:fld>
             <a:endParaRPr lang="de-AT"/>
           </a:p>
@@ -5991,7 +6043,7 @@
           <a:p>
             <a:fld id="{83C286D2-5717-406C-AD4B-C4A69D5338FB}" type="datetimeFigureOut">
               <a:rPr lang="de-AT" smtClean="0"/>
-              <a:t>20.01.2018</a:t>
+              <a:t>31.03.2018</a:t>
             </a:fld>
             <a:endParaRPr lang="de-AT"/>
           </a:p>
@@ -6161,7 +6213,7 @@
           <a:p>
             <a:fld id="{83C286D2-5717-406C-AD4B-C4A69D5338FB}" type="datetimeFigureOut">
               <a:rPr lang="de-AT" smtClean="0"/>
-              <a:t>20.01.2018</a:t>
+              <a:t>31.03.2018</a:t>
             </a:fld>
             <a:endParaRPr lang="de-AT"/>
           </a:p>
@@ -6341,7 +6393,7 @@
           <a:p>
             <a:fld id="{83C286D2-5717-406C-AD4B-C4A69D5338FB}" type="datetimeFigureOut">
               <a:rPr lang="de-AT" smtClean="0"/>
-              <a:t>20.01.2018</a:t>
+              <a:t>31.03.2018</a:t>
             </a:fld>
             <a:endParaRPr lang="de-AT"/>
           </a:p>
@@ -6626,7 +6678,7 @@
           <a:p>
             <a:fld id="{83C286D2-5717-406C-AD4B-C4A69D5338FB}" type="datetimeFigureOut">
               <a:rPr lang="de-AT" smtClean="0"/>
-              <a:t>20.01.2018</a:t>
+              <a:t>31.03.2018</a:t>
             </a:fld>
             <a:endParaRPr lang="de-AT"/>
           </a:p>
@@ -6796,7 +6848,7 @@
           <a:p>
             <a:fld id="{83C286D2-5717-406C-AD4B-C4A69D5338FB}" type="datetimeFigureOut">
               <a:rPr lang="de-AT" smtClean="0"/>
-              <a:t>20.01.2018</a:t>
+              <a:t>31.03.2018</a:t>
             </a:fld>
             <a:endParaRPr lang="de-AT"/>
           </a:p>
@@ -7054,7 +7106,7 @@
           <a:p>
             <a:fld id="{83C286D2-5717-406C-AD4B-C4A69D5338FB}" type="datetimeFigureOut">
               <a:rPr lang="de-AT" smtClean="0"/>
-              <a:t>20.01.2018</a:t>
+              <a:t>31.03.2018</a:t>
             </a:fld>
             <a:endParaRPr lang="de-AT"/>
           </a:p>
@@ -7342,7 +7394,7 @@
           <a:p>
             <a:fld id="{83C286D2-5717-406C-AD4B-C4A69D5338FB}" type="datetimeFigureOut">
               <a:rPr lang="de-AT" smtClean="0"/>
-              <a:t>20.01.2018</a:t>
+              <a:t>31.03.2018</a:t>
             </a:fld>
             <a:endParaRPr lang="de-AT"/>
           </a:p>
@@ -7784,7 +7836,7 @@
           <a:p>
             <a:fld id="{83C286D2-5717-406C-AD4B-C4A69D5338FB}" type="datetimeFigureOut">
               <a:rPr lang="de-AT" smtClean="0"/>
-              <a:t>20.01.2018</a:t>
+              <a:t>31.03.2018</a:t>
             </a:fld>
             <a:endParaRPr lang="de-AT"/>
           </a:p>
@@ -7902,7 +7954,7 @@
           <a:p>
             <a:fld id="{83C286D2-5717-406C-AD4B-C4A69D5338FB}" type="datetimeFigureOut">
               <a:rPr lang="de-AT" smtClean="0"/>
-              <a:t>20.01.2018</a:t>
+              <a:t>31.03.2018</a:t>
             </a:fld>
             <a:endParaRPr lang="de-AT"/>
           </a:p>
@@ -7997,7 +8049,7 @@
           <a:p>
             <a:fld id="{83C286D2-5717-406C-AD4B-C4A69D5338FB}" type="datetimeFigureOut">
               <a:rPr lang="de-AT" smtClean="0"/>
-              <a:t>20.01.2018</a:t>
+              <a:t>31.03.2018</a:t>
             </a:fld>
             <a:endParaRPr lang="de-AT"/>
           </a:p>
@@ -8248,7 +8300,7 @@
           <a:p>
             <a:fld id="{83C286D2-5717-406C-AD4B-C4A69D5338FB}" type="datetimeFigureOut">
               <a:rPr lang="de-AT" smtClean="0"/>
-              <a:t>20.01.2018</a:t>
+              <a:t>31.03.2018</a:t>
             </a:fld>
             <a:endParaRPr lang="de-AT"/>
           </a:p>
@@ -8536,7 +8588,7 @@
           <a:p>
             <a:fld id="{83C286D2-5717-406C-AD4B-C4A69D5338FB}" type="datetimeFigureOut">
               <a:rPr lang="de-AT" smtClean="0"/>
-              <a:t>20.01.2018</a:t>
+              <a:t>31.03.2018</a:t>
             </a:fld>
             <a:endParaRPr lang="de-AT"/>
           </a:p>
@@ -8809,7 +8861,7 @@
           <a:p>
             <a:fld id="{83C286D2-5717-406C-AD4B-C4A69D5338FB}" type="datetimeFigureOut">
               <a:rPr lang="de-AT" smtClean="0"/>
-              <a:t>20.01.2018</a:t>
+              <a:t>31.03.2018</a:t>
             </a:fld>
             <a:endParaRPr lang="de-AT"/>
           </a:p>
@@ -8984,7 +9036,7 @@
           <a:p>
             <a:fld id="{83C286D2-5717-406C-AD4B-C4A69D5338FB}" type="datetimeFigureOut">
               <a:rPr lang="de-AT" smtClean="0"/>
-              <a:t>20.01.2018</a:t>
+              <a:t>31.03.2018</a:t>
             </a:fld>
             <a:endParaRPr lang="de-AT"/>
           </a:p>
@@ -9164,7 +9216,7 @@
           <a:p>
             <a:fld id="{83C286D2-5717-406C-AD4B-C4A69D5338FB}" type="datetimeFigureOut">
               <a:rPr lang="de-AT" smtClean="0"/>
-              <a:t>20.01.2018</a:t>
+              <a:t>31.03.2018</a:t>
             </a:fld>
             <a:endParaRPr lang="de-AT"/>
           </a:p>
@@ -9396,7 +9448,7 @@
           <a:p>
             <a:fld id="{83C286D2-5717-406C-AD4B-C4A69D5338FB}" type="datetimeFigureOut">
               <a:rPr lang="de-AT" smtClean="0"/>
-              <a:t>20.01.2018</a:t>
+              <a:t>31.03.2018</a:t>
             </a:fld>
             <a:endParaRPr lang="de-AT"/>
           </a:p>
@@ -9743,7 +9795,7 @@
           <a:p>
             <a:fld id="{83C286D2-5717-406C-AD4B-C4A69D5338FB}" type="datetimeFigureOut">
               <a:rPr lang="de-AT" smtClean="0"/>
-              <a:t>20.01.2018</a:t>
+              <a:t>31.03.2018</a:t>
             </a:fld>
             <a:endParaRPr lang="de-AT"/>
           </a:p>
@@ -9861,7 +9913,7 @@
           <a:p>
             <a:fld id="{83C286D2-5717-406C-AD4B-C4A69D5338FB}" type="datetimeFigureOut">
               <a:rPr lang="de-AT" smtClean="0"/>
-              <a:t>20.01.2018</a:t>
+              <a:t>31.03.2018</a:t>
             </a:fld>
             <a:endParaRPr lang="de-AT"/>
           </a:p>
@@ -9979,7 +10031,7 @@
           <a:p>
             <a:fld id="{83C286D2-5717-406C-AD4B-C4A69D5338FB}" type="datetimeFigureOut">
               <a:rPr lang="de-AT" smtClean="0"/>
-              <a:t>20.01.2018</a:t>
+              <a:t>31.03.2018</a:t>
             </a:fld>
             <a:endParaRPr lang="de-AT"/>
           </a:p>
@@ -10263,7 +10315,7 @@
           <a:p>
             <a:fld id="{83C286D2-5717-406C-AD4B-C4A69D5338FB}" type="datetimeFigureOut">
               <a:rPr lang="de-AT" smtClean="0"/>
-              <a:t>20.01.2018</a:t>
+              <a:t>31.03.2018</a:t>
             </a:fld>
             <a:endParaRPr lang="de-AT"/>
           </a:p>
@@ -10527,7 +10579,7 @@
           <a:p>
             <a:fld id="{83C286D2-5717-406C-AD4B-C4A69D5338FB}" type="datetimeFigureOut">
               <a:rPr lang="de-AT" smtClean="0"/>
-              <a:t>20.01.2018</a:t>
+              <a:t>31.03.2018</a:t>
             </a:fld>
             <a:endParaRPr lang="de-AT"/>
           </a:p>
@@ -10741,7 +10793,7 @@
           <a:p>
             <a:fld id="{83C286D2-5717-406C-AD4B-C4A69D5338FB}" type="datetimeFigureOut">
               <a:rPr lang="de-AT" smtClean="0"/>
-              <a:t>20.01.2018</a:t>
+              <a:t>31.03.2018</a:t>
             </a:fld>
             <a:endParaRPr lang="de-AT"/>
           </a:p>
@@ -11276,7 +11328,7 @@
           <a:p>
             <a:fld id="{83C286D2-5717-406C-AD4B-C4A69D5338FB}" type="datetimeFigureOut">
               <a:rPr lang="de-AT" smtClean="0"/>
-              <a:t>20.01.2018</a:t>
+              <a:t>31.03.2018</a:t>
             </a:fld>
             <a:endParaRPr lang="de-AT"/>
           </a:p>
@@ -11889,7 +11941,7 @@
           <a:p>
             <a:fld id="{83C286D2-5717-406C-AD4B-C4A69D5338FB}" type="datetimeFigureOut">
               <a:rPr lang="de-AT" smtClean="0"/>
-              <a:t>20.01.2018</a:t>
+              <a:t>31.03.2018</a:t>
             </a:fld>
             <a:endParaRPr lang="de-AT"/>
           </a:p>
@@ -12494,6 +12546,153 @@
   <p:clrMapOvr>
     <a:masterClrMapping/>
   </p:clrMapOvr>
+  <mc:AlternateContent xmlns:mc="http://schemas.openxmlformats.org/markup-compatibility/2006">
+    <mc:Choice xmlns:p14="http://schemas.microsoft.com/office/powerpoint/2010/main" Requires="p14">
+      <p:transition spd="slow" p14:dur="1200" advTm="10000">
+        <p14:prism/>
+      </p:transition>
+    </mc:Choice>
+    <mc:Fallback>
+      <p:transition spd="slow" advTm="10000">
+        <p:fade/>
+      </p:transition>
+    </mc:Fallback>
+  </mc:AlternateContent>
+</p:sld>
+</file>
+
+<file path=ppt/slides/slide10.xml><?xml version="1.0" encoding="utf-8"?>
+<p:sld xmlns:a="http://schemas.openxmlformats.org/drawingml/2006/main" xmlns:r="http://schemas.openxmlformats.org/officeDocument/2006/relationships" xmlns:p="http://schemas.openxmlformats.org/presentationml/2006/main">
+  <p:cSld>
+    <p:spTree>
+      <p:nvGrpSpPr>
+        <p:cNvPr id="1" name=""/>
+        <p:cNvGrpSpPr/>
+        <p:nvPr/>
+      </p:nvGrpSpPr>
+      <p:grpSpPr>
+        <a:xfrm>
+          <a:off x="0" y="0"/>
+          <a:ext cx="0" cy="0"/>
+          <a:chOff x="0" y="0"/>
+          <a:chExt cx="0" cy="0"/>
+        </a:xfrm>
+      </p:grpSpPr>
+      <p:sp>
+        <p:nvSpPr>
+          <p:cNvPr id="2" name="Titel 1">
+            <a:extLst>
+              <a:ext uri="{FF2B5EF4-FFF2-40B4-BE49-F238E27FC236}">
+                <a16:creationId xmlns:a16="http://schemas.microsoft.com/office/drawing/2014/main" id="{A00691C1-9125-4FE3-B5F2-ED7AF1953269}"/>
+              </a:ext>
+            </a:extLst>
+          </p:cNvPr>
+          <p:cNvSpPr>
+            <a:spLocks noGrp="1"/>
+          </p:cNvSpPr>
+          <p:nvPr>
+            <p:ph type="title"/>
+          </p:nvPr>
+        </p:nvSpPr>
+        <p:spPr/>
+        <p:txBody>
+          <a:bodyPr/>
+          <a:lstStyle/>
+          <a:p>
+            <a:r>
+              <a:rPr lang="de-AT" dirty="0"/>
+              <a:t>Vielen Dank für Ihr Interesse</a:t>
+            </a:r>
+          </a:p>
+        </p:txBody>
+      </p:sp>
+      <p:pic>
+        <p:nvPicPr>
+          <p:cNvPr id="9" name="Grafik 8">
+            <a:extLst>
+              <a:ext uri="{FF2B5EF4-FFF2-40B4-BE49-F238E27FC236}">
+                <a16:creationId xmlns:a16="http://schemas.microsoft.com/office/drawing/2014/main" id="{7A9E9A6D-6D04-448C-A464-E3DDDA9B0D35}"/>
+              </a:ext>
+            </a:extLst>
+          </p:cNvPr>
+          <p:cNvPicPr>
+            <a:picLocks noChangeAspect="1"/>
+          </p:cNvPicPr>
+          <p:nvPr/>
+        </p:nvPicPr>
+        <p:blipFill rotWithShape="1">
+          <a:blip r:embed="rId3"/>
+          <a:srcRect l="53214" t="31608" b="13398"/>
+          <a:stretch/>
+        </p:blipFill>
+        <p:spPr>
+          <a:xfrm>
+            <a:off x="3850106" y="2065110"/>
+            <a:ext cx="3007382" cy="3071560"/>
+          </a:xfrm>
+          <a:prstGeom prst="rect">
+            <a:avLst/>
+          </a:prstGeom>
+        </p:spPr>
+      </p:pic>
+      <p:pic>
+        <p:nvPicPr>
+          <p:cNvPr id="13" name="Grafik 12">
+            <a:extLst>
+              <a:ext uri="{FF2B5EF4-FFF2-40B4-BE49-F238E27FC236}">
+                <a16:creationId xmlns:a16="http://schemas.microsoft.com/office/drawing/2014/main" id="{C6DBC83D-91CA-41A5-9393-8D10C4F014BC}"/>
+              </a:ext>
+            </a:extLst>
+          </p:cNvPr>
+          <p:cNvPicPr>
+            <a:picLocks noChangeAspect="1"/>
+          </p:cNvPicPr>
+          <p:nvPr/>
+        </p:nvPicPr>
+        <p:blipFill>
+          <a:blip r:embed="rId4">
+            <a:extLst>
+              <a:ext uri="{28A0092B-C50C-407E-A947-70E740481C1C}">
+                <a14:useLocalDpi xmlns:a14="http://schemas.microsoft.com/office/drawing/2010/main" val="0"/>
+              </a:ext>
+            </a:extLst>
+          </a:blip>
+          <a:stretch>
+            <a:fillRect/>
+          </a:stretch>
+        </p:blipFill>
+        <p:spPr>
+          <a:xfrm>
+            <a:off x="7221126" y="1439216"/>
+            <a:ext cx="3941490" cy="3970424"/>
+          </a:xfrm>
+          <a:prstGeom prst="rect">
+            <a:avLst/>
+          </a:prstGeom>
+        </p:spPr>
+      </p:pic>
+    </p:spTree>
+    <p:extLst>
+      <p:ext uri="{BB962C8B-B14F-4D97-AF65-F5344CB8AC3E}">
+        <p14:creationId xmlns:p14="http://schemas.microsoft.com/office/powerpoint/2010/main" val="3816333060"/>
+      </p:ext>
+    </p:extLst>
+  </p:cSld>
+  <p:clrMapOvr>
+    <a:masterClrMapping/>
+  </p:clrMapOvr>
+  <mc:AlternateContent xmlns:mc="http://schemas.openxmlformats.org/markup-compatibility/2006">
+    <mc:Choice xmlns:p14="http://schemas.microsoft.com/office/powerpoint/2010/main" Requires="p14">
+      <p:transition spd="slow" p14:dur="1200" advTm="10000">
+        <p14:prism/>
+      </p:transition>
+    </mc:Choice>
+    <mc:Fallback>
+      <p:transition spd="slow" advTm="10000">
+        <p:fade/>
+      </p:transition>
+    </mc:Fallback>
+  </mc:AlternateContent>
 </p:sld>
 </file>
 
@@ -12530,38 +12729,10 @@
             <p:ph type="title"/>
           </p:nvPr>
         </p:nvSpPr>
-        <p:spPr/>
-        <p:txBody>
-          <a:bodyPr/>
-          <a:lstStyle/>
-          <a:p>
-            <a:r>
-              <a:rPr lang="de-AT" dirty="0"/>
-              <a:t>Rahmeninfos</a:t>
-            </a:r>
-          </a:p>
-        </p:txBody>
-      </p:sp>
-      <p:sp>
-        <p:nvSpPr>
-          <p:cNvPr id="5" name="Inhaltsplatzhalter 4">
-            <a:extLst>
-              <a:ext uri="{FF2B5EF4-FFF2-40B4-BE49-F238E27FC236}">
-                <a16:creationId xmlns:a16="http://schemas.microsoft.com/office/drawing/2014/main" id="{304F8BC6-DF7A-4CD1-B19E-8F8ECAACFD8C}"/>
-              </a:ext>
-            </a:extLst>
-          </p:cNvPr>
-          <p:cNvSpPr>
-            <a:spLocks noGrp="1"/>
-          </p:cNvSpPr>
-          <p:nvPr>
-            <p:ph idx="1"/>
-          </p:nvPr>
-        </p:nvSpPr>
         <p:spPr>
           <a:xfrm>
-            <a:off x="3869268" y="864108"/>
-            <a:ext cx="7315200" cy="5120640"/>
+            <a:off x="144379" y="1123837"/>
+            <a:ext cx="3188076" cy="4601183"/>
           </a:xfrm>
         </p:spPr>
         <p:txBody>
@@ -12570,80 +12741,24 @@
           </a:bodyPr>
           <a:lstStyle/>
           <a:p>
-            <a:pPr marL="0" indent="0">
-              <a:buNone/>
-            </a:pPr>
-            <a:r>
-              <a:rPr lang="de-AT" sz="2400" b="1" dirty="0"/>
-              <a:t>Auftraggeber:</a:t>
+            <a:r>
+              <a:rPr lang="de-AT" sz="3400" dirty="0"/>
+              <a:t>Auftraggeber</a:t>
             </a:r>
             <a:br>
-              <a:rPr lang="de-AT" sz="2400" b="1" dirty="0"/>
+              <a:rPr lang="de-AT" sz="3400" dirty="0"/>
             </a:br>
             <a:r>
-              <a:rPr lang="de-AT" sz="2400" dirty="0"/>
-              <a:t>Energiegenossenschaft Eferding</a:t>
+              <a:rPr lang="de-AT" sz="3400" dirty="0"/>
+              <a:t>und</a:t>
             </a:r>
             <a:br>
-              <a:rPr lang="de-AT" sz="2400" dirty="0"/>
+              <a:rPr lang="de-AT" sz="3400" dirty="0"/>
             </a:br>
             <a:r>
-              <a:rPr lang="de-AT" sz="2400" dirty="0"/>
-              <a:t>Ing. Herbert </a:t>
-            </a:r>
-            <a:r>
-              <a:rPr lang="de-AT" sz="2400" dirty="0" err="1"/>
-              <a:t>Pötzlberger</a:t>
-            </a:r>
-            <a:r>
-              <a:rPr lang="de-AT" sz="2400" dirty="0"/>
-              <a:t>, </a:t>
-            </a:r>
-            <a:r>
-              <a:rPr lang="de-AT" sz="2400" dirty="0" err="1"/>
-              <a:t>MSc</a:t>
-            </a:r>
-            <a:endParaRPr lang="de-AT" sz="2400" dirty="0"/>
-          </a:p>
-          <a:p>
-            <a:pPr marL="0" indent="0">
-              <a:buNone/>
-            </a:pPr>
-            <a:endParaRPr lang="de-AT" sz="2400" b="1" dirty="0"/>
-          </a:p>
-          <a:p>
-            <a:pPr marL="0" indent="0">
-              <a:buNone/>
-            </a:pPr>
-            <a:r>
-              <a:rPr lang="de-AT" sz="2400" b="1" dirty="0"/>
-              <a:t>Team:</a:t>
-            </a:r>
-            <a:br>
-              <a:rPr lang="de-AT" sz="2400" b="1" dirty="0"/>
-            </a:br>
-            <a:r>
-              <a:rPr lang="de-AT" sz="2400" dirty="0"/>
-              <a:t>Lukas Knoll (Projektleiter)</a:t>
-            </a:r>
-            <a:br>
-              <a:rPr lang="de-AT" sz="2400" dirty="0"/>
-            </a:br>
-            <a:r>
-              <a:rPr lang="de-AT" sz="2400" dirty="0"/>
-              <a:t>Niklas Graf</a:t>
-            </a:r>
-            <a:br>
-              <a:rPr lang="de-AT" sz="2400" dirty="0"/>
-            </a:br>
-            <a:r>
-              <a:rPr lang="de-AT" sz="2400" dirty="0"/>
-              <a:t>Sebastian Mandl</a:t>
-            </a:r>
-            <a:br>
-              <a:rPr lang="de-AT" sz="2400" b="1" dirty="0"/>
-            </a:br>
-            <a:endParaRPr lang="de-AT" sz="2400" b="1" dirty="0"/>
+              <a:rPr lang="de-AT" sz="3400" dirty="0"/>
+              <a:t>Betreuungslehrer</a:t>
+            </a:r>
           </a:p>
         </p:txBody>
       </p:sp>
@@ -12676,8 +12791,8 @@
         </p:blipFill>
         <p:spPr bwMode="auto">
           <a:xfrm>
-            <a:off x="8310659" y="868588"/>
-            <a:ext cx="3333750" cy="1257300"/>
+            <a:off x="8331716" y="241453"/>
+            <a:ext cx="3188076" cy="1202360"/>
           </a:xfrm>
           <a:prstGeom prst="rect">
             <a:avLst/>
@@ -12694,6 +12809,186 @@
           </a:extLst>
         </p:spPr>
       </p:pic>
+      <p:pic>
+        <p:nvPicPr>
+          <p:cNvPr id="6" name="Grafik 5">
+            <a:extLst>
+              <a:ext uri="{FF2B5EF4-FFF2-40B4-BE49-F238E27FC236}">
+                <a16:creationId xmlns:a16="http://schemas.microsoft.com/office/drawing/2014/main" id="{111CDE74-BD6E-4FB4-A331-FF5888644A28}"/>
+              </a:ext>
+            </a:extLst>
+          </p:cNvPr>
+          <p:cNvPicPr>
+            <a:picLocks noChangeAspect="1"/>
+          </p:cNvPicPr>
+          <p:nvPr/>
+        </p:nvPicPr>
+        <p:blipFill>
+          <a:blip r:embed="rId4">
+            <a:extLst>
+              <a:ext uri="{28A0092B-C50C-407E-A947-70E740481C1C}">
+                <a14:useLocalDpi xmlns:a14="http://schemas.microsoft.com/office/drawing/2010/main" val="0"/>
+              </a:ext>
+            </a:extLst>
+          </a:blip>
+          <a:stretch>
+            <a:fillRect/>
+          </a:stretch>
+        </p:blipFill>
+        <p:spPr>
+          <a:xfrm>
+            <a:off x="4234522" y="1458231"/>
+            <a:ext cx="1569402" cy="2092536"/>
+          </a:xfrm>
+          <a:prstGeom prst="rect">
+            <a:avLst/>
+          </a:prstGeom>
+        </p:spPr>
+      </p:pic>
+      <p:sp>
+        <p:nvSpPr>
+          <p:cNvPr id="7" name="Textfeld 6">
+            <a:extLst>
+              <a:ext uri="{FF2B5EF4-FFF2-40B4-BE49-F238E27FC236}">
+                <a16:creationId xmlns:a16="http://schemas.microsoft.com/office/drawing/2014/main" id="{66D17646-29D6-45F2-A0D1-0CDBDA7A026F}"/>
+              </a:ext>
+            </a:extLst>
+          </p:cNvPr>
+          <p:cNvSpPr txBox="1"/>
+          <p:nvPr/>
+        </p:nvSpPr>
+        <p:spPr>
+          <a:xfrm>
+            <a:off x="6126907" y="1904334"/>
+            <a:ext cx="4922962" cy="1200329"/>
+          </a:xfrm>
+          <a:prstGeom prst="rect">
+            <a:avLst/>
+          </a:prstGeom>
+          <a:noFill/>
+        </p:spPr>
+        <p:txBody>
+          <a:bodyPr wrap="square" rtlCol="0">
+            <a:spAutoFit/>
+          </a:bodyPr>
+          <a:lstStyle/>
+          <a:p>
+            <a:r>
+              <a:rPr lang="de-AT" sz="2400" b="1" dirty="0"/>
+              <a:t>Ansprechperson der Energiegenossenschaft</a:t>
+            </a:r>
+            <a:endParaRPr lang="de-AT" b="1" dirty="0"/>
+          </a:p>
+          <a:p>
+            <a:r>
+              <a:rPr lang="de-AT" sz="2400" dirty="0"/>
+              <a:t>Ing. Herbert </a:t>
+            </a:r>
+            <a:r>
+              <a:rPr lang="de-AT" sz="2400" dirty="0" err="1"/>
+              <a:t>Pölzlberger</a:t>
+            </a:r>
+            <a:r>
+              <a:rPr lang="de-AT" sz="2400" dirty="0"/>
+              <a:t>, </a:t>
+            </a:r>
+            <a:r>
+              <a:rPr lang="de-AT" sz="2400" dirty="0" err="1"/>
+              <a:t>MSc</a:t>
+            </a:r>
+            <a:endParaRPr lang="de-AT" sz="2400" dirty="0"/>
+          </a:p>
+        </p:txBody>
+      </p:sp>
+      <p:pic>
+        <p:nvPicPr>
+          <p:cNvPr id="10" name="Picture 6" descr="Ähnliches Foto">
+            <a:extLst>
+              <a:ext uri="{FF2B5EF4-FFF2-40B4-BE49-F238E27FC236}">
+                <a16:creationId xmlns:a16="http://schemas.microsoft.com/office/drawing/2014/main" id="{C7567902-29CD-4167-AFE3-91D387ADBE70}"/>
+              </a:ext>
+            </a:extLst>
+          </p:cNvPr>
+          <p:cNvPicPr>
+            <a:picLocks noChangeAspect="1" noChangeArrowheads="1"/>
+          </p:cNvPicPr>
+          <p:nvPr/>
+        </p:nvPicPr>
+        <p:blipFill>
+          <a:blip r:embed="rId5">
+            <a:extLst>
+              <a:ext uri="{28A0092B-C50C-407E-A947-70E740481C1C}">
+                <a14:useLocalDpi xmlns:a14="http://schemas.microsoft.com/office/drawing/2010/main" val="0"/>
+              </a:ext>
+            </a:extLst>
+          </a:blip>
+          <a:srcRect/>
+          <a:stretch>
+            <a:fillRect/>
+          </a:stretch>
+        </p:blipFill>
+        <p:spPr bwMode="auto">
+          <a:xfrm>
+            <a:off x="4219264" y="3918662"/>
+            <a:ext cx="1552576" cy="2192673"/>
+          </a:xfrm>
+          <a:prstGeom prst="rect">
+            <a:avLst/>
+          </a:prstGeom>
+          <a:noFill/>
+          <a:extLst>
+            <a:ext uri="{909E8E84-426E-40DD-AFC4-6F175D3DCCD1}">
+              <a14:hiddenFill xmlns:a14="http://schemas.microsoft.com/office/drawing/2010/main">
+                <a:solidFill>
+                  <a:srgbClr val="FFFFFF"/>
+                </a:solidFill>
+              </a14:hiddenFill>
+            </a:ext>
+          </a:extLst>
+        </p:spPr>
+      </p:pic>
+      <p:sp>
+        <p:nvSpPr>
+          <p:cNvPr id="11" name="Textfeld 10">
+            <a:extLst>
+              <a:ext uri="{FF2B5EF4-FFF2-40B4-BE49-F238E27FC236}">
+                <a16:creationId xmlns:a16="http://schemas.microsoft.com/office/drawing/2014/main" id="{8A55A1F2-6F9C-4D87-A4D5-3293D6BE7DAB}"/>
+              </a:ext>
+            </a:extLst>
+          </p:cNvPr>
+          <p:cNvSpPr txBox="1"/>
+          <p:nvPr/>
+        </p:nvSpPr>
+        <p:spPr>
+          <a:xfrm>
+            <a:off x="6126907" y="4599499"/>
+            <a:ext cx="4922962" cy="830997"/>
+          </a:xfrm>
+          <a:prstGeom prst="rect">
+            <a:avLst/>
+          </a:prstGeom>
+          <a:noFill/>
+        </p:spPr>
+        <p:txBody>
+          <a:bodyPr wrap="square" rtlCol="0">
+            <a:spAutoFit/>
+          </a:bodyPr>
+          <a:lstStyle/>
+          <a:p>
+            <a:r>
+              <a:rPr lang="de-AT" sz="2400" b="1" dirty="0"/>
+              <a:t>Betreuungslehrer</a:t>
+            </a:r>
+            <a:endParaRPr lang="de-AT" b="1" dirty="0"/>
+          </a:p>
+          <a:p>
+            <a:r>
+              <a:rPr lang="de-AT" sz="2400" dirty="0"/>
+              <a:t>DI Josef Doppelbauer</a:t>
+            </a:r>
+          </a:p>
+        </p:txBody>
+      </p:sp>
     </p:spTree>
     <p:extLst>
       <p:ext uri="{BB962C8B-B14F-4D97-AF65-F5344CB8AC3E}">
@@ -12704,10 +12999,326 @@
   <p:clrMapOvr>
     <a:masterClrMapping/>
   </p:clrMapOvr>
+  <mc:AlternateContent xmlns:mc="http://schemas.openxmlformats.org/markup-compatibility/2006">
+    <mc:Choice xmlns:p14="http://schemas.microsoft.com/office/powerpoint/2010/main" Requires="p14">
+      <p:transition spd="slow" p14:dur="1200" advTm="10000">
+        <p14:prism/>
+      </p:transition>
+    </mc:Choice>
+    <mc:Fallback>
+      <p:transition spd="slow" advTm="10000">
+        <p:fade/>
+      </p:transition>
+    </mc:Fallback>
+  </mc:AlternateContent>
 </p:sld>
 </file>
 
 <file path=ppt/slides/slide3.xml><?xml version="1.0" encoding="utf-8"?>
+<p:sld xmlns:a="http://schemas.openxmlformats.org/drawingml/2006/main" xmlns:r="http://schemas.openxmlformats.org/officeDocument/2006/relationships" xmlns:p="http://schemas.openxmlformats.org/presentationml/2006/main">
+  <p:cSld>
+    <p:spTree>
+      <p:nvGrpSpPr>
+        <p:cNvPr id="1" name=""/>
+        <p:cNvGrpSpPr/>
+        <p:nvPr/>
+      </p:nvGrpSpPr>
+      <p:grpSpPr>
+        <a:xfrm>
+          <a:off x="0" y="0"/>
+          <a:ext cx="0" cy="0"/>
+          <a:chOff x="0" y="0"/>
+          <a:chExt cx="0" cy="0"/>
+        </a:xfrm>
+      </p:grpSpPr>
+      <p:sp>
+        <p:nvSpPr>
+          <p:cNvPr id="2" name="Titel 1">
+            <a:extLst>
+              <a:ext uri="{FF2B5EF4-FFF2-40B4-BE49-F238E27FC236}">
+                <a16:creationId xmlns:a16="http://schemas.microsoft.com/office/drawing/2014/main" id="{B730D2EF-F09F-4E29-9232-53AE13C82B3A}"/>
+              </a:ext>
+            </a:extLst>
+          </p:cNvPr>
+          <p:cNvSpPr>
+            <a:spLocks noGrp="1"/>
+          </p:cNvSpPr>
+          <p:nvPr>
+            <p:ph type="title"/>
+          </p:nvPr>
+        </p:nvSpPr>
+        <p:spPr/>
+        <p:txBody>
+          <a:bodyPr/>
+          <a:lstStyle/>
+          <a:p>
+            <a:r>
+              <a:rPr lang="de-AT" dirty="0"/>
+              <a:t>Das Team</a:t>
+            </a:r>
+          </a:p>
+        </p:txBody>
+      </p:sp>
+      <p:pic>
+        <p:nvPicPr>
+          <p:cNvPr id="10" name="Grafik 9">
+            <a:extLst>
+              <a:ext uri="{FF2B5EF4-FFF2-40B4-BE49-F238E27FC236}">
+                <a16:creationId xmlns:a16="http://schemas.microsoft.com/office/drawing/2014/main" id="{7406C7D1-88AA-4934-9876-D0A1B7E6BE6C}"/>
+              </a:ext>
+            </a:extLst>
+          </p:cNvPr>
+          <p:cNvPicPr>
+            <a:picLocks noChangeAspect="1"/>
+          </p:cNvPicPr>
+          <p:nvPr/>
+        </p:nvPicPr>
+        <p:blipFill>
+          <a:blip r:embed="rId2">
+            <a:extLst>
+              <a:ext uri="{28A0092B-C50C-407E-A947-70E740481C1C}">
+                <a14:useLocalDpi xmlns:a14="http://schemas.microsoft.com/office/drawing/2010/main" val="0"/>
+              </a:ext>
+            </a:extLst>
+          </a:blip>
+          <a:stretch>
+            <a:fillRect/>
+          </a:stretch>
+        </p:blipFill>
+        <p:spPr>
+          <a:xfrm>
+            <a:off x="5400752" y="757573"/>
+            <a:ext cx="1207007" cy="1720332"/>
+          </a:xfrm>
+          <a:prstGeom prst="rect">
+            <a:avLst/>
+          </a:prstGeom>
+        </p:spPr>
+      </p:pic>
+      <p:pic>
+        <p:nvPicPr>
+          <p:cNvPr id="12" name="Grafik 11">
+            <a:extLst>
+              <a:ext uri="{FF2B5EF4-FFF2-40B4-BE49-F238E27FC236}">
+                <a16:creationId xmlns:a16="http://schemas.microsoft.com/office/drawing/2014/main" id="{02E08722-57A9-4A97-85C4-F33DFB567B02}"/>
+              </a:ext>
+            </a:extLst>
+          </p:cNvPr>
+          <p:cNvPicPr>
+            <a:picLocks noChangeAspect="1"/>
+          </p:cNvPicPr>
+          <p:nvPr/>
+        </p:nvPicPr>
+        <p:blipFill>
+          <a:blip r:embed="rId3">
+            <a:extLst>
+              <a:ext uri="{28A0092B-C50C-407E-A947-70E740481C1C}">
+                <a14:useLocalDpi xmlns:a14="http://schemas.microsoft.com/office/drawing/2010/main" val="0"/>
+              </a:ext>
+            </a:extLst>
+          </a:blip>
+          <a:stretch>
+            <a:fillRect/>
+          </a:stretch>
+        </p:blipFill>
+        <p:spPr>
+          <a:xfrm>
+            <a:off x="5373695" y="2568833"/>
+            <a:ext cx="1234063" cy="1720333"/>
+          </a:xfrm>
+          <a:prstGeom prst="rect">
+            <a:avLst/>
+          </a:prstGeom>
+        </p:spPr>
+      </p:pic>
+      <p:pic>
+        <p:nvPicPr>
+          <p:cNvPr id="14" name="Grafik 13">
+            <a:extLst>
+              <a:ext uri="{FF2B5EF4-FFF2-40B4-BE49-F238E27FC236}">
+                <a16:creationId xmlns:a16="http://schemas.microsoft.com/office/drawing/2014/main" id="{4314A7E6-B8D9-43B0-9889-05882D22A082}"/>
+              </a:ext>
+            </a:extLst>
+          </p:cNvPr>
+          <p:cNvPicPr>
+            <a:picLocks noChangeAspect="1"/>
+          </p:cNvPicPr>
+          <p:nvPr/>
+        </p:nvPicPr>
+        <p:blipFill>
+          <a:blip r:embed="rId4">
+            <a:extLst>
+              <a:ext uri="{28A0092B-C50C-407E-A947-70E740481C1C}">
+                <a14:useLocalDpi xmlns:a14="http://schemas.microsoft.com/office/drawing/2010/main" val="0"/>
+              </a:ext>
+            </a:extLst>
+          </a:blip>
+          <a:stretch>
+            <a:fillRect/>
+          </a:stretch>
+        </p:blipFill>
+        <p:spPr>
+          <a:xfrm>
+            <a:off x="5400751" y="4467424"/>
+            <a:ext cx="1207007" cy="1671618"/>
+          </a:xfrm>
+          <a:prstGeom prst="rect">
+            <a:avLst/>
+          </a:prstGeom>
+        </p:spPr>
+      </p:pic>
+      <p:sp>
+        <p:nvSpPr>
+          <p:cNvPr id="15" name="Textfeld 14">
+            <a:extLst>
+              <a:ext uri="{FF2B5EF4-FFF2-40B4-BE49-F238E27FC236}">
+                <a16:creationId xmlns:a16="http://schemas.microsoft.com/office/drawing/2014/main" id="{F81F30DB-933A-4586-A7FA-5A47D53A4C0D}"/>
+              </a:ext>
+            </a:extLst>
+          </p:cNvPr>
+          <p:cNvSpPr txBox="1"/>
+          <p:nvPr/>
+        </p:nvSpPr>
+        <p:spPr>
+          <a:xfrm>
+            <a:off x="6896920" y="1202240"/>
+            <a:ext cx="4922962" cy="830997"/>
+          </a:xfrm>
+          <a:prstGeom prst="rect">
+            <a:avLst/>
+          </a:prstGeom>
+          <a:noFill/>
+        </p:spPr>
+        <p:txBody>
+          <a:bodyPr wrap="square" rtlCol="0">
+            <a:spAutoFit/>
+          </a:bodyPr>
+          <a:lstStyle/>
+          <a:p>
+            <a:r>
+              <a:rPr lang="de-AT" sz="2400" b="1" dirty="0"/>
+              <a:t>Projektleiter</a:t>
+            </a:r>
+            <a:endParaRPr lang="de-AT" b="1" dirty="0"/>
+          </a:p>
+          <a:p>
+            <a:r>
+              <a:rPr lang="de-AT" sz="2400" dirty="0"/>
+              <a:t>Lukas Knoll</a:t>
+            </a:r>
+          </a:p>
+        </p:txBody>
+      </p:sp>
+      <p:sp>
+        <p:nvSpPr>
+          <p:cNvPr id="16" name="Textfeld 15">
+            <a:extLst>
+              <a:ext uri="{FF2B5EF4-FFF2-40B4-BE49-F238E27FC236}">
+                <a16:creationId xmlns:a16="http://schemas.microsoft.com/office/drawing/2014/main" id="{C8D1FD57-E3D6-4CDF-838B-35655BF485C3}"/>
+              </a:ext>
+            </a:extLst>
+          </p:cNvPr>
+          <p:cNvSpPr txBox="1"/>
+          <p:nvPr/>
+        </p:nvSpPr>
+        <p:spPr>
+          <a:xfrm>
+            <a:off x="6896920" y="3008929"/>
+            <a:ext cx="4922962" cy="830997"/>
+          </a:xfrm>
+          <a:prstGeom prst="rect">
+            <a:avLst/>
+          </a:prstGeom>
+          <a:noFill/>
+        </p:spPr>
+        <p:txBody>
+          <a:bodyPr wrap="square" rtlCol="0">
+            <a:spAutoFit/>
+          </a:bodyPr>
+          <a:lstStyle/>
+          <a:p>
+            <a:r>
+              <a:rPr lang="de-AT" sz="2400" b="1" dirty="0"/>
+              <a:t>Teammitglied</a:t>
+            </a:r>
+            <a:endParaRPr lang="de-AT" b="1" dirty="0"/>
+          </a:p>
+          <a:p>
+            <a:r>
+              <a:rPr lang="de-AT" sz="2400" dirty="0"/>
+              <a:t>Niklas Graf</a:t>
+            </a:r>
+          </a:p>
+        </p:txBody>
+      </p:sp>
+      <p:sp>
+        <p:nvSpPr>
+          <p:cNvPr id="17" name="Textfeld 16">
+            <a:extLst>
+              <a:ext uri="{FF2B5EF4-FFF2-40B4-BE49-F238E27FC236}">
+                <a16:creationId xmlns:a16="http://schemas.microsoft.com/office/drawing/2014/main" id="{6AA0DB95-D902-470A-B570-18D256953A67}"/>
+              </a:ext>
+            </a:extLst>
+          </p:cNvPr>
+          <p:cNvSpPr txBox="1"/>
+          <p:nvPr/>
+        </p:nvSpPr>
+        <p:spPr>
+          <a:xfrm>
+            <a:off x="6896920" y="4815618"/>
+            <a:ext cx="4922962" cy="830997"/>
+          </a:xfrm>
+          <a:prstGeom prst="rect">
+            <a:avLst/>
+          </a:prstGeom>
+          <a:noFill/>
+        </p:spPr>
+        <p:txBody>
+          <a:bodyPr wrap="square" rtlCol="0">
+            <a:spAutoFit/>
+          </a:bodyPr>
+          <a:lstStyle/>
+          <a:p>
+            <a:r>
+              <a:rPr lang="de-AT" sz="2400" b="1" dirty="0"/>
+              <a:t>Teammitglied</a:t>
+            </a:r>
+            <a:endParaRPr lang="de-AT" b="1" dirty="0"/>
+          </a:p>
+          <a:p>
+            <a:r>
+              <a:rPr lang="de-AT" sz="2400" dirty="0"/>
+              <a:t>Sebastian Mandl</a:t>
+            </a:r>
+          </a:p>
+        </p:txBody>
+      </p:sp>
+    </p:spTree>
+    <p:extLst>
+      <p:ext uri="{BB962C8B-B14F-4D97-AF65-F5344CB8AC3E}">
+        <p14:creationId xmlns:p14="http://schemas.microsoft.com/office/powerpoint/2010/main" val="3559279767"/>
+      </p:ext>
+    </p:extLst>
+  </p:cSld>
+  <p:clrMapOvr>
+    <a:masterClrMapping/>
+  </p:clrMapOvr>
+  <mc:AlternateContent xmlns:mc="http://schemas.openxmlformats.org/markup-compatibility/2006">
+    <mc:Choice xmlns:p14="http://schemas.microsoft.com/office/powerpoint/2010/main" Requires="p14">
+      <p:transition spd="slow" p14:dur="1200" advTm="10000">
+        <p14:prism/>
+      </p:transition>
+    </mc:Choice>
+    <mc:Fallback>
+      <p:transition spd="slow" advTm="10000">
+        <p:fade/>
+      </p:transition>
+    </mc:Fallback>
+  </mc:AlternateContent>
+</p:sld>
+</file>
+
+<file path=ppt/slides/slide4.xml><?xml version="1.0" encoding="utf-8"?>
 <p:sld xmlns:a="http://schemas.openxmlformats.org/drawingml/2006/main" xmlns:r="http://schemas.openxmlformats.org/officeDocument/2006/relationships" xmlns:p="http://schemas.openxmlformats.org/presentationml/2006/main">
   <p:cSld>
     <p:spTree>
@@ -12798,99 +13409,18 @@
   <p:clrMapOvr>
     <a:masterClrMapping/>
   </p:clrMapOvr>
-</p:sld>
-</file>
-
-<file path=ppt/slides/slide4.xml><?xml version="1.0" encoding="utf-8"?>
-<p:sld xmlns:a="http://schemas.openxmlformats.org/drawingml/2006/main" xmlns:r="http://schemas.openxmlformats.org/officeDocument/2006/relationships" xmlns:p="http://schemas.openxmlformats.org/presentationml/2006/main">
-  <p:cSld>
-    <p:spTree>
-      <p:nvGrpSpPr>
-        <p:cNvPr id="1" name=""/>
-        <p:cNvGrpSpPr/>
-        <p:nvPr/>
-      </p:nvGrpSpPr>
-      <p:grpSpPr>
-        <a:xfrm>
-          <a:off x="0" y="0"/>
-          <a:ext cx="0" cy="0"/>
-          <a:chOff x="0" y="0"/>
-          <a:chExt cx="0" cy="0"/>
-        </a:xfrm>
-      </p:grpSpPr>
-      <p:sp>
-        <p:nvSpPr>
-          <p:cNvPr id="2" name="Titel 1">
-            <a:extLst>
-              <a:ext uri="{FF2B5EF4-FFF2-40B4-BE49-F238E27FC236}">
-                <a16:creationId xmlns:a16="http://schemas.microsoft.com/office/drawing/2014/main" id="{FF009CDD-A893-4223-A90B-6E8DC5FBC732}"/>
-              </a:ext>
-            </a:extLst>
-          </p:cNvPr>
-          <p:cNvSpPr>
-            <a:spLocks noGrp="1"/>
-          </p:cNvSpPr>
-          <p:nvPr>
-            <p:ph type="title"/>
-          </p:nvPr>
-        </p:nvSpPr>
-        <p:spPr/>
-        <p:txBody>
-          <a:bodyPr/>
-          <a:lstStyle/>
-          <a:p>
-            <a:r>
-              <a:rPr lang="de-AT" dirty="0"/>
-              <a:t>Integration mit Netz-online</a:t>
-            </a:r>
-          </a:p>
-        </p:txBody>
-      </p:sp>
-      <p:pic>
-        <p:nvPicPr>
-          <p:cNvPr id="7" name="Inhaltsplatzhalter 6">
-            <a:extLst>
-              <a:ext uri="{FF2B5EF4-FFF2-40B4-BE49-F238E27FC236}">
-                <a16:creationId xmlns:a16="http://schemas.microsoft.com/office/drawing/2014/main" id="{D72B1EC8-E98D-4E45-BE44-8097CDF2007F}"/>
-              </a:ext>
-            </a:extLst>
-          </p:cNvPr>
-          <p:cNvPicPr>
-            <a:picLocks noGrp="1" noChangeAspect="1"/>
-          </p:cNvPicPr>
-          <p:nvPr>
-            <p:ph idx="1"/>
-          </p:nvPr>
-        </p:nvPicPr>
-        <p:blipFill>
-          <a:blip r:embed="rId2">
-            <a:extLst>
-              <a:ext uri="{28A0092B-C50C-407E-A947-70E740481C1C}">
-                <a14:useLocalDpi xmlns:a14="http://schemas.microsoft.com/office/drawing/2010/main" val="0"/>
-              </a:ext>
-            </a:extLst>
-          </a:blip>
-          <a:stretch>
-            <a:fillRect/>
-          </a:stretch>
-        </p:blipFill>
-        <p:spPr>
-          <a:xfrm>
-            <a:off x="3911096" y="1533261"/>
-            <a:ext cx="7230484" cy="3781953"/>
-          </a:xfrm>
-        </p:spPr>
-      </p:pic>
-    </p:spTree>
-    <p:extLst>
-      <p:ext uri="{BB962C8B-B14F-4D97-AF65-F5344CB8AC3E}">
-        <p14:creationId xmlns:p14="http://schemas.microsoft.com/office/powerpoint/2010/main" val="445562203"/>
-      </p:ext>
-    </p:extLst>
-  </p:cSld>
-  <p:clrMapOvr>
-    <a:masterClrMapping/>
-  </p:clrMapOvr>
+  <mc:AlternateContent xmlns:mc="http://schemas.openxmlformats.org/markup-compatibility/2006">
+    <mc:Choice xmlns:p14="http://schemas.microsoft.com/office/powerpoint/2010/main" Requires="p14">
+      <p:transition spd="slow" p14:dur="1200" advTm="10000">
+        <p14:prism/>
+      </p:transition>
+    </mc:Choice>
+    <mc:Fallback>
+      <p:transition spd="slow" advTm="10000">
+        <p:fade/>
+      </p:transition>
+    </mc:Fallback>
+  </mc:AlternateContent>
 </p:sld>
 </file>
 
@@ -12916,6 +13446,116 @@
           <p:cNvPr id="2" name="Titel 1">
             <a:extLst>
               <a:ext uri="{FF2B5EF4-FFF2-40B4-BE49-F238E27FC236}">
+                <a16:creationId xmlns:a16="http://schemas.microsoft.com/office/drawing/2014/main" id="{FF009CDD-A893-4223-A90B-6E8DC5FBC732}"/>
+              </a:ext>
+            </a:extLst>
+          </p:cNvPr>
+          <p:cNvSpPr>
+            <a:spLocks noGrp="1"/>
+          </p:cNvSpPr>
+          <p:nvPr>
+            <p:ph type="title"/>
+          </p:nvPr>
+        </p:nvSpPr>
+        <p:spPr/>
+        <p:txBody>
+          <a:bodyPr/>
+          <a:lstStyle/>
+          <a:p>
+            <a:r>
+              <a:rPr lang="de-AT" dirty="0"/>
+              <a:t>Integration mit Netz-online</a:t>
+            </a:r>
+          </a:p>
+        </p:txBody>
+      </p:sp>
+      <p:pic>
+        <p:nvPicPr>
+          <p:cNvPr id="7" name="Inhaltsplatzhalter 6">
+            <a:extLst>
+              <a:ext uri="{FF2B5EF4-FFF2-40B4-BE49-F238E27FC236}">
+                <a16:creationId xmlns:a16="http://schemas.microsoft.com/office/drawing/2014/main" id="{D72B1EC8-E98D-4E45-BE44-8097CDF2007F}"/>
+              </a:ext>
+            </a:extLst>
+          </p:cNvPr>
+          <p:cNvPicPr>
+            <a:picLocks noGrp="1" noChangeAspect="1"/>
+          </p:cNvPicPr>
+          <p:nvPr>
+            <p:ph idx="1"/>
+          </p:nvPr>
+        </p:nvPicPr>
+        <p:blipFill>
+          <a:blip r:embed="rId2">
+            <a:extLst>
+              <a:ext uri="{28A0092B-C50C-407E-A947-70E740481C1C}">
+                <a14:useLocalDpi xmlns:a14="http://schemas.microsoft.com/office/drawing/2010/main" val="0"/>
+              </a:ext>
+            </a:extLst>
+          </a:blip>
+          <a:stretch>
+            <a:fillRect/>
+          </a:stretch>
+        </p:blipFill>
+        <p:spPr>
+          <a:xfrm>
+            <a:off x="3911096" y="1533261"/>
+            <a:ext cx="7230484" cy="3781953"/>
+          </a:xfrm>
+          <a:ln w="38100">
+            <a:solidFill>
+              <a:schemeClr val="tx1"/>
+            </a:solidFill>
+          </a:ln>
+        </p:spPr>
+      </p:pic>
+    </p:spTree>
+    <p:extLst>
+      <p:ext uri="{BB962C8B-B14F-4D97-AF65-F5344CB8AC3E}">
+        <p14:creationId xmlns:p14="http://schemas.microsoft.com/office/powerpoint/2010/main" val="445562203"/>
+      </p:ext>
+    </p:extLst>
+  </p:cSld>
+  <p:clrMapOvr>
+    <a:masterClrMapping/>
+  </p:clrMapOvr>
+  <mc:AlternateContent xmlns:mc="http://schemas.openxmlformats.org/markup-compatibility/2006">
+    <mc:Choice xmlns:p14="http://schemas.microsoft.com/office/powerpoint/2010/main" Requires="p14">
+      <p:transition spd="slow" p14:dur="1200" advTm="10000">
+        <p14:prism/>
+      </p:transition>
+    </mc:Choice>
+    <mc:Fallback>
+      <p:transition spd="slow" advTm="10000">
+        <p:fade/>
+      </p:transition>
+    </mc:Fallback>
+  </mc:AlternateContent>
+</p:sld>
+</file>
+
+<file path=ppt/slides/slide6.xml><?xml version="1.0" encoding="utf-8"?>
+<p:sld xmlns:a="http://schemas.openxmlformats.org/drawingml/2006/main" xmlns:r="http://schemas.openxmlformats.org/officeDocument/2006/relationships" xmlns:p="http://schemas.openxmlformats.org/presentationml/2006/main">
+  <p:cSld>
+    <p:spTree>
+      <p:nvGrpSpPr>
+        <p:cNvPr id="1" name=""/>
+        <p:cNvGrpSpPr/>
+        <p:nvPr/>
+      </p:nvGrpSpPr>
+      <p:grpSpPr>
+        <a:xfrm>
+          <a:off x="0" y="0"/>
+          <a:ext cx="0" cy="0"/>
+          <a:chOff x="0" y="0"/>
+          <a:chExt cx="0" cy="0"/>
+        </a:xfrm>
+      </p:grpSpPr>
+      <p:sp>
+        <p:nvSpPr>
+          <p:cNvPr id="2" name="Titel 1">
+            <a:extLst>
+              <a:ext uri="{FF2B5EF4-FFF2-40B4-BE49-F238E27FC236}">
                 <a16:creationId xmlns:a16="http://schemas.microsoft.com/office/drawing/2014/main" id="{7BF763A6-42BB-46AC-A7EF-866B1BE75C45}"/>
               </a:ext>
             </a:extLst>
@@ -12977,6 +13617,11 @@
             <a:off x="4160929" y="863790"/>
             <a:ext cx="6730818" cy="5121275"/>
           </a:xfrm>
+          <a:ln w="38100">
+            <a:solidFill>
+              <a:schemeClr val="tx1"/>
+            </a:solidFill>
+          </a:ln>
         </p:spPr>
       </p:pic>
       <p:pic>
@@ -13007,12 +13652,17 @@
         </p:blipFill>
         <p:spPr>
           <a:xfrm>
-            <a:off x="4160929" y="687439"/>
+            <a:off x="3933826" y="658864"/>
             <a:ext cx="7354326" cy="5744377"/>
           </a:xfrm>
           <a:prstGeom prst="rect">
             <a:avLst/>
           </a:prstGeom>
+          <a:ln w="38100">
+            <a:solidFill>
+              <a:schemeClr val="tx1"/>
+            </a:solidFill>
+          </a:ln>
         </p:spPr>
       </p:pic>
     </p:spTree>
@@ -13025,6 +13675,18 @@
   <p:clrMapOvr>
     <a:masterClrMapping/>
   </p:clrMapOvr>
+  <mc:AlternateContent xmlns:mc="http://schemas.openxmlformats.org/markup-compatibility/2006">
+    <mc:Choice xmlns:p14="http://schemas.microsoft.com/office/powerpoint/2010/main" Requires="p14">
+      <p:transition spd="slow" p14:dur="1200" advTm="10000">
+        <p14:prism/>
+      </p:transition>
+    </mc:Choice>
+    <mc:Fallback>
+      <p:transition spd="slow" advTm="10000">
+        <p:fade/>
+      </p:transition>
+    </mc:Fallback>
+  </mc:AlternateContent>
   <p:timing>
     <p:tnLst>
       <p:par>
@@ -13111,89 +13773,6 @@
 </p:sld>
 </file>
 
-<file path=ppt/slides/slide6.xml><?xml version="1.0" encoding="utf-8"?>
-<p:sld xmlns:a="http://schemas.openxmlformats.org/drawingml/2006/main" xmlns:r="http://schemas.openxmlformats.org/officeDocument/2006/relationships" xmlns:p="http://schemas.openxmlformats.org/presentationml/2006/main">
-  <p:cSld>
-    <p:spTree>
-      <p:nvGrpSpPr>
-        <p:cNvPr id="1" name=""/>
-        <p:cNvGrpSpPr/>
-        <p:nvPr/>
-      </p:nvGrpSpPr>
-      <p:grpSpPr>
-        <a:xfrm>
-          <a:off x="0" y="0"/>
-          <a:ext cx="0" cy="0"/>
-          <a:chOff x="0" y="0"/>
-          <a:chExt cx="0" cy="0"/>
-        </a:xfrm>
-      </p:grpSpPr>
-      <p:sp>
-        <p:nvSpPr>
-          <p:cNvPr id="2" name="Titel 1">
-            <a:extLst>
-              <a:ext uri="{FF2B5EF4-FFF2-40B4-BE49-F238E27FC236}">
-                <a16:creationId xmlns:a16="http://schemas.microsoft.com/office/drawing/2014/main" id="{18484A04-A67B-417C-BFDB-2A05B1E5D787}"/>
-              </a:ext>
-            </a:extLst>
-          </p:cNvPr>
-          <p:cNvSpPr>
-            <a:spLocks noGrp="1"/>
-          </p:cNvSpPr>
-          <p:nvPr>
-            <p:ph type="title"/>
-          </p:nvPr>
-        </p:nvSpPr>
-        <p:spPr/>
-        <p:txBody>
-          <a:bodyPr/>
-          <a:lstStyle/>
-          <a:p>
-            <a:r>
-              <a:rPr lang="de-AT" dirty="0"/>
-              <a:t>Grafischer Editor für </a:t>
-            </a:r>
-          </a:p>
-        </p:txBody>
-      </p:sp>
-      <p:sp>
-        <p:nvSpPr>
-          <p:cNvPr id="3" name="Inhaltsplatzhalter 2">
-            <a:extLst>
-              <a:ext uri="{FF2B5EF4-FFF2-40B4-BE49-F238E27FC236}">
-                <a16:creationId xmlns:a16="http://schemas.microsoft.com/office/drawing/2014/main" id="{40A08597-C991-47BF-BB14-3451A1843BE6}"/>
-              </a:ext>
-            </a:extLst>
-          </p:cNvPr>
-          <p:cNvSpPr>
-            <a:spLocks noGrp="1"/>
-          </p:cNvSpPr>
-          <p:nvPr>
-            <p:ph idx="1"/>
-          </p:nvPr>
-        </p:nvSpPr>
-        <p:spPr/>
-        <p:txBody>
-          <a:bodyPr/>
-          <a:lstStyle/>
-          <a:p>
-            <a:endParaRPr lang="de-AT"/>
-          </a:p>
-        </p:txBody>
-      </p:sp>
-    </p:spTree>
-    <p:extLst>
-      <p:ext uri="{BB962C8B-B14F-4D97-AF65-F5344CB8AC3E}">
-        <p14:creationId xmlns:p14="http://schemas.microsoft.com/office/powerpoint/2010/main" val="1029183873"/>
-      </p:ext>
-    </p:extLst>
-  </p:cSld>
-  <p:clrMapOvr>
-    <a:masterClrMapping/>
-  </p:clrMapOvr>
-</p:sld>
-</file>
-
 <file path=ppt/slides/slide7.xml><?xml version="1.0" encoding="utf-8"?>
 <p:sld xmlns:a="http://schemas.openxmlformats.org/drawingml/2006/main" xmlns:r="http://schemas.openxmlformats.org/officeDocument/2006/relationships" xmlns:p="http://schemas.openxmlformats.org/presentationml/2006/main">
   <p:cSld>
@@ -13216,7 +13795,7 @@
           <p:cNvPr id="2" name="Titel 1">
             <a:extLst>
               <a:ext uri="{FF2B5EF4-FFF2-40B4-BE49-F238E27FC236}">
-                <a16:creationId xmlns:a16="http://schemas.microsoft.com/office/drawing/2014/main" id="{133039DE-AF67-4489-95CD-B55AD58C7971}"/>
+                <a16:creationId xmlns:a16="http://schemas.microsoft.com/office/drawing/2014/main" id="{840EAA48-03E4-42A8-BCEA-6FD934C5DAFF}"/>
               </a:ext>
             </a:extLst>
           </p:cNvPr>
@@ -13234,17 +13813,17 @@
           <a:p>
             <a:r>
               <a:rPr lang="de-AT" dirty="0"/>
-              <a:t>Einfache Administration</a:t>
+              <a:t>Android – App, um auch unterwegs stets informiert zu sein</a:t>
             </a:r>
           </a:p>
         </p:txBody>
       </p:sp>
       <p:pic>
         <p:nvPicPr>
-          <p:cNvPr id="9" name="Inhaltsplatzhalter 8">
+          <p:cNvPr id="5" name="Inhaltsplatzhalter 4">
             <a:extLst>
               <a:ext uri="{FF2B5EF4-FFF2-40B4-BE49-F238E27FC236}">
-                <a16:creationId xmlns:a16="http://schemas.microsoft.com/office/drawing/2014/main" id="{2F3CEFD3-29B6-4AD8-9858-EAF567B1C680}"/>
+                <a16:creationId xmlns:a16="http://schemas.microsoft.com/office/drawing/2014/main" id="{FA57E544-966F-4361-92E7-56B5398169A1}"/>
               </a:ext>
             </a:extLst>
           </p:cNvPr>
@@ -13255,7 +13834,7 @@
             <p:ph idx="1"/>
           </p:nvPr>
         </p:nvPicPr>
-        <p:blipFill>
+        <p:blipFill rotWithShape="1">
           <a:blip r:embed="rId2">
             <a:extLst>
               <a:ext uri="{28A0092B-C50C-407E-A947-70E740481C1C}">
@@ -13263,27 +13842,83 @@
               </a:ext>
             </a:extLst>
           </a:blip>
-          <a:stretch>
-            <a:fillRect/>
-          </a:stretch>
+          <a:srcRect l="5001" t="11531" r="5101" b="17486"/>
+          <a:stretch/>
         </p:blipFill>
         <p:spPr>
           <a:xfrm>
-            <a:off x="3868738" y="1631670"/>
-            <a:ext cx="7315200" cy="3585134"/>
+            <a:off x="3771900" y="472360"/>
+            <a:ext cx="3676650" cy="5913280"/>
           </a:xfrm>
+          <a:ln w="38100">
+            <a:solidFill>
+              <a:schemeClr val="tx1"/>
+            </a:solidFill>
+          </a:ln>
+        </p:spPr>
+      </p:pic>
+      <p:pic>
+        <p:nvPicPr>
+          <p:cNvPr id="7" name="Grafik 6">
+            <a:extLst>
+              <a:ext uri="{FF2B5EF4-FFF2-40B4-BE49-F238E27FC236}">
+                <a16:creationId xmlns:a16="http://schemas.microsoft.com/office/drawing/2014/main" id="{92B724B4-9934-43E7-882D-B71393045212}"/>
+              </a:ext>
+            </a:extLst>
+          </p:cNvPr>
+          <p:cNvPicPr>
+            <a:picLocks noChangeAspect="1"/>
+          </p:cNvPicPr>
+          <p:nvPr/>
+        </p:nvPicPr>
+        <p:blipFill rotWithShape="1">
+          <a:blip r:embed="rId3">
+            <a:extLst>
+              <a:ext uri="{28A0092B-C50C-407E-A947-70E740481C1C}">
+                <a14:useLocalDpi xmlns:a14="http://schemas.microsoft.com/office/drawing/2010/main" val="0"/>
+              </a:ext>
+            </a:extLst>
+          </a:blip>
+          <a:srcRect l="11005" t="14914" r="7948" b="16691"/>
+          <a:stretch/>
+        </p:blipFill>
+        <p:spPr>
+          <a:xfrm>
+            <a:off x="7772399" y="472360"/>
+            <a:ext cx="3594947" cy="5913280"/>
+          </a:xfrm>
+          <a:prstGeom prst="rect">
+            <a:avLst/>
+          </a:prstGeom>
+          <a:ln w="38100">
+            <a:solidFill>
+              <a:schemeClr val="tx1"/>
+            </a:solidFill>
+          </a:ln>
         </p:spPr>
       </p:pic>
     </p:spTree>
     <p:extLst>
       <p:ext uri="{BB962C8B-B14F-4D97-AF65-F5344CB8AC3E}">
-        <p14:creationId xmlns:p14="http://schemas.microsoft.com/office/powerpoint/2010/main" val="206274602"/>
+        <p14:creationId xmlns:p14="http://schemas.microsoft.com/office/powerpoint/2010/main" val="193052026"/>
       </p:ext>
     </p:extLst>
   </p:cSld>
   <p:clrMapOvr>
     <a:masterClrMapping/>
   </p:clrMapOvr>
+  <mc:AlternateContent xmlns:mc="http://schemas.openxmlformats.org/markup-compatibility/2006">
+    <mc:Choice xmlns:p14="http://schemas.microsoft.com/office/powerpoint/2010/main" Requires="p14">
+      <p:transition spd="slow" p14:dur="1200" advTm="10000">
+        <p14:prism/>
+      </p:transition>
+    </mc:Choice>
+    <mc:Fallback>
+      <p:transition spd="slow" advTm="10000">
+        <p:fade/>
+      </p:transition>
+    </mc:Fallback>
+  </mc:AlternateContent>
 </p:sld>
 </file>
 
@@ -13309,7 +13944,7 @@
           <p:cNvPr id="2" name="Titel 1">
             <a:extLst>
               <a:ext uri="{FF2B5EF4-FFF2-40B4-BE49-F238E27FC236}">
-                <a16:creationId xmlns:a16="http://schemas.microsoft.com/office/drawing/2014/main" id="{A00691C1-9125-4FE3-B5F2-ED7AF1953269}"/>
+                <a16:creationId xmlns:a16="http://schemas.microsoft.com/office/drawing/2014/main" id="{18484A04-A67B-417C-BFDB-2A05B1E5D787}"/>
               </a:ext>
             </a:extLst>
           </p:cNvPr>
@@ -13327,7 +13962,7 @@
           <a:p>
             <a:r>
               <a:rPr lang="de-AT" dirty="0"/>
-              <a:t>Fragen?</a:t>
+              <a:t>Grafischer Editor </a:t>
             </a:r>
           </a:p>
         </p:txBody>
@@ -13337,7 +13972,7 @@
           <p:cNvPr id="3" name="Inhaltsplatzhalter 2">
             <a:extLst>
               <a:ext uri="{FF2B5EF4-FFF2-40B4-BE49-F238E27FC236}">
-                <a16:creationId xmlns:a16="http://schemas.microsoft.com/office/drawing/2014/main" id="{A6AC614C-E1A2-4975-B0FB-B16781777739}"/>
+                <a16:creationId xmlns:a16="http://schemas.microsoft.com/office/drawing/2014/main" id="{40A08597-C991-47BF-BB14-3451A1843BE6}"/>
               </a:ext>
             </a:extLst>
           </p:cNvPr>
@@ -13350,31 +13985,145 @@
         </p:nvSpPr>
         <p:spPr/>
         <p:txBody>
-          <a:bodyPr>
-            <a:normAutofit/>
-          </a:bodyPr>
-          <a:lstStyle/>
-          <a:p>
-            <a:pPr marL="0" indent="0" algn="ctr">
-              <a:buNone/>
-            </a:pPr>
-            <a:r>
-              <a:rPr lang="de-AT" sz="3500" dirty="0"/>
-              <a:t>Danke für Ihre Aufmerksamkeit</a:t>
-            </a:r>
+          <a:bodyPr/>
+          <a:lstStyle/>
+          <a:p>
+            <a:endParaRPr lang="de-AT"/>
           </a:p>
         </p:txBody>
       </p:sp>
     </p:spTree>
     <p:extLst>
       <p:ext uri="{BB962C8B-B14F-4D97-AF65-F5344CB8AC3E}">
-        <p14:creationId xmlns:p14="http://schemas.microsoft.com/office/powerpoint/2010/main" val="3816333060"/>
+        <p14:creationId xmlns:p14="http://schemas.microsoft.com/office/powerpoint/2010/main" val="1029183873"/>
       </p:ext>
     </p:extLst>
   </p:cSld>
   <p:clrMapOvr>
     <a:masterClrMapping/>
   </p:clrMapOvr>
+  <mc:AlternateContent xmlns:mc="http://schemas.openxmlformats.org/markup-compatibility/2006">
+    <mc:Choice xmlns:p14="http://schemas.microsoft.com/office/powerpoint/2010/main" Requires="p14">
+      <p:transition spd="slow" p14:dur="1200" advTm="10000">
+        <p14:prism/>
+      </p:transition>
+    </mc:Choice>
+    <mc:Fallback>
+      <p:transition spd="slow" advTm="10000">
+        <p:fade/>
+      </p:transition>
+    </mc:Fallback>
+  </mc:AlternateContent>
+</p:sld>
+</file>
+
+<file path=ppt/slides/slide9.xml><?xml version="1.0" encoding="utf-8"?>
+<p:sld xmlns:a="http://schemas.openxmlformats.org/drawingml/2006/main" xmlns:r="http://schemas.openxmlformats.org/officeDocument/2006/relationships" xmlns:p="http://schemas.openxmlformats.org/presentationml/2006/main">
+  <p:cSld>
+    <p:spTree>
+      <p:nvGrpSpPr>
+        <p:cNvPr id="1" name=""/>
+        <p:cNvGrpSpPr/>
+        <p:nvPr/>
+      </p:nvGrpSpPr>
+      <p:grpSpPr>
+        <a:xfrm>
+          <a:off x="0" y="0"/>
+          <a:ext cx="0" cy="0"/>
+          <a:chOff x="0" y="0"/>
+          <a:chExt cx="0" cy="0"/>
+        </a:xfrm>
+      </p:grpSpPr>
+      <p:sp>
+        <p:nvSpPr>
+          <p:cNvPr id="2" name="Titel 1">
+            <a:extLst>
+              <a:ext uri="{FF2B5EF4-FFF2-40B4-BE49-F238E27FC236}">
+                <a16:creationId xmlns:a16="http://schemas.microsoft.com/office/drawing/2014/main" id="{133039DE-AF67-4489-95CD-B55AD58C7971}"/>
+              </a:ext>
+            </a:extLst>
+          </p:cNvPr>
+          <p:cNvSpPr>
+            <a:spLocks noGrp="1"/>
+          </p:cNvSpPr>
+          <p:nvPr>
+            <p:ph type="title"/>
+          </p:nvPr>
+        </p:nvSpPr>
+        <p:spPr/>
+        <p:txBody>
+          <a:bodyPr/>
+          <a:lstStyle/>
+          <a:p>
+            <a:r>
+              <a:rPr lang="de-AT" dirty="0"/>
+              <a:t>Einfache Administration</a:t>
+            </a:r>
+          </a:p>
+        </p:txBody>
+      </p:sp>
+      <p:pic>
+        <p:nvPicPr>
+          <p:cNvPr id="4" name="Grafik 3">
+            <a:extLst>
+              <a:ext uri="{FF2B5EF4-FFF2-40B4-BE49-F238E27FC236}">
+                <a16:creationId xmlns:a16="http://schemas.microsoft.com/office/drawing/2014/main" id="{3B957FC7-1AC6-464F-91DD-2171BBC36BA5}"/>
+              </a:ext>
+            </a:extLst>
+          </p:cNvPr>
+          <p:cNvPicPr>
+            <a:picLocks noChangeAspect="1"/>
+          </p:cNvPicPr>
+          <p:nvPr/>
+        </p:nvPicPr>
+        <p:blipFill rotWithShape="1">
+          <a:blip r:embed="rId2">
+            <a:extLst>
+              <a:ext uri="{28A0092B-C50C-407E-A947-70E740481C1C}">
+                <a14:useLocalDpi xmlns:a14="http://schemas.microsoft.com/office/drawing/2010/main" val="0"/>
+              </a:ext>
+            </a:extLst>
+          </a:blip>
+          <a:srcRect t="6030" r="68289" b="26033"/>
+          <a:stretch/>
+        </p:blipFill>
+        <p:spPr>
+          <a:xfrm>
+            <a:off x="4879921" y="375425"/>
+            <a:ext cx="5451195" cy="6107150"/>
+          </a:xfrm>
+          <a:prstGeom prst="rect">
+            <a:avLst/>
+          </a:prstGeom>
+          <a:ln w="38100">
+            <a:solidFill>
+              <a:schemeClr val="tx1"/>
+            </a:solidFill>
+          </a:ln>
+        </p:spPr>
+      </p:pic>
+    </p:spTree>
+    <p:extLst>
+      <p:ext uri="{BB962C8B-B14F-4D97-AF65-F5344CB8AC3E}">
+        <p14:creationId xmlns:p14="http://schemas.microsoft.com/office/powerpoint/2010/main" val="206274602"/>
+      </p:ext>
+    </p:extLst>
+  </p:cSld>
+  <p:clrMapOvr>
+    <a:masterClrMapping/>
+  </p:clrMapOvr>
+  <mc:AlternateContent xmlns:mc="http://schemas.openxmlformats.org/markup-compatibility/2006">
+    <mc:Choice xmlns:p14="http://schemas.microsoft.com/office/powerpoint/2010/main" Requires="p14">
+      <p:transition spd="slow" p14:dur="1200" advTm="10000">
+        <p14:prism/>
+      </p:transition>
+    </mc:Choice>
+    <mc:Fallback>
+      <p:transition spd="slow" advTm="10000">
+        <p:fade/>
+      </p:transition>
+    </mc:Fallback>
+  </mc:AlternateContent>
 </p:sld>
 </file>
 

</xml_diff>